<commit_message>
Update 1. Etapa de Definição.pptx
</commit_message>
<xml_diff>
--- a/1. Etapa de Definição.pptx
+++ b/1. Etapa de Definição.pptx
@@ -1082,6 +1082,30 @@
     </pc:docChg>
   </pc:docChgLst>
   <pc:docChgLst>
+    <pc:chgData name="Lucas Guaragna Guedes" userId="d31d6021-56d9-4e04-b382-63463036a011" providerId="ADAL" clId="{052586AA-3129-48D4-BE0D-3A7A876AFB0D}"/>
+    <pc:docChg chg="modSld">
+      <pc:chgData name="Lucas Guaragna Guedes" userId="d31d6021-56d9-4e04-b382-63463036a011" providerId="ADAL" clId="{052586AA-3129-48D4-BE0D-3A7A876AFB0D}" dt="2023-07-27T14:34:50.005" v="0" actId="20577"/>
+      <pc:docMkLst>
+        <pc:docMk/>
+      </pc:docMkLst>
+      <pc:sldChg chg="modSp mod">
+        <pc:chgData name="Lucas Guaragna Guedes" userId="d31d6021-56d9-4e04-b382-63463036a011" providerId="ADAL" clId="{052586AA-3129-48D4-BE0D-3A7A876AFB0D}" dt="2023-07-27T14:34:50.005" v="0" actId="20577"/>
+        <pc:sldMkLst>
+          <pc:docMk/>
+          <pc:sldMk cId="1924804868" sldId="363"/>
+        </pc:sldMkLst>
+        <pc:spChg chg="mod">
+          <ac:chgData name="Lucas Guaragna Guedes" userId="d31d6021-56d9-4e04-b382-63463036a011" providerId="ADAL" clId="{052586AA-3129-48D4-BE0D-3A7A876AFB0D}" dt="2023-07-27T14:34:50.005" v="0" actId="20577"/>
+          <ac:spMkLst>
+            <pc:docMk/>
+            <pc:sldMk cId="1924804868" sldId="363"/>
+            <ac:spMk id="21" creationId="{A62EFA69-1B2F-265C-B196-058760CADABC}"/>
+          </ac:spMkLst>
+        </pc:spChg>
+      </pc:sldChg>
+    </pc:docChg>
+  </pc:docChgLst>
+  <pc:docChgLst>
     <pc:chgData name="Lucas Guaragna Guedes" userId="d31d6021-56d9-4e04-b382-63463036a011" providerId="ADAL" clId="{B57888C3-9952-4339-91AA-F599A39DC7B5}"/>
     <pc:docChg chg="undo custSel addSld delSld modSld">
       <pc:chgData name="Lucas Guaragna Guedes" userId="d31d6021-56d9-4e04-b382-63463036a011" providerId="ADAL" clId="{B57888C3-9952-4339-91AA-F599A39DC7B5}" dt="2023-07-27T14:06:22.771" v="163" actId="113"/>
@@ -4882,21 +4906,10 @@
                   </a:schemeClr>
                 </a:solidFill>
               </a:rPr>
-              <a:t>R</a:t>
+              <a:t>R$180.480,00</a:t>
             </a:r>
             <a:r>
-              <a:rPr lang="pt-BR" sz="2000" b="1" u="sng">
-                <a:solidFill>
-                  <a:schemeClr val="tx1">
-                    <a:lumMod val="85000"/>
-                    <a:lumOff val="15000"/>
-                  </a:schemeClr>
-                </a:solidFill>
-              </a:rPr>
-              <a:t>$180.480,00</a:t>
-            </a:r>
-            <a:r>
-              <a:rPr lang="pt-BR" sz="2000">
+              <a:rPr lang="pt-BR" sz="2000" dirty="0">
                 <a:solidFill>
                   <a:schemeClr val="tx1">
                     <a:lumMod val="85000"/>
@@ -19129,7 +19142,7 @@
                   </a:schemeClr>
                 </a:solidFill>
               </a:rPr>
-              <a:t>Como p-valor &gt; 0.5, concluímos que temos uma </a:t>
+              <a:t>Como p-valor &gt; 0.05, concluímos que temos uma </a:t>
             </a:r>
             <a:r>
               <a:rPr lang="pt-BR" sz="2200" b="1" dirty="0">

</xml_diff>